<commit_message>
fixing lots of small stuff
</commit_message>
<xml_diff>
--- a/images/intro/money.pptx
+++ b/images/intro/money.pptx
@@ -8255,8 +8255,8 @@
           <a:chExt cx="0" cy="0"/>
         </a:xfrm>
       </p:grpSpPr>
-      <mc:AlternateContent xmlns:mc="http://schemas.openxmlformats.org/markup-compatibility/2006">
-        <mc:Choice xmlns:p14="http://schemas.microsoft.com/office/powerpoint/2010/main" Requires="p14">
+      <mc:AlternateContent xmlns:mc="http://schemas.openxmlformats.org/markup-compatibility/2006" xmlns:p14="http://schemas.microsoft.com/office/powerpoint/2010/main">
+        <mc:Choice Requires="p14">
           <p:contentPart p14:bwMode="auto" r:id="rId2">
             <p14:nvContentPartPr>
               <p14:cNvPr id="37" name="Ink 36">
@@ -8275,7 +8275,7 @@
             </p14:xfrm>
           </p:contentPart>
         </mc:Choice>
-        <mc:Fallback>
+        <mc:Fallback xmlns="">
           <p:pic>
             <p:nvPicPr>
               <p:cNvPr id="37" name="Ink 36">
@@ -8306,8 +8306,8 @@
           </p:pic>
         </mc:Fallback>
       </mc:AlternateContent>
-      <mc:AlternateContent xmlns:mc="http://schemas.openxmlformats.org/markup-compatibility/2006">
-        <mc:Choice xmlns:p14="http://schemas.microsoft.com/office/powerpoint/2010/main" Requires="p14">
+      <mc:AlternateContent xmlns:mc="http://schemas.openxmlformats.org/markup-compatibility/2006" xmlns:p14="http://schemas.microsoft.com/office/powerpoint/2010/main">
+        <mc:Choice Requires="p14">
           <p:contentPart p14:bwMode="auto" r:id="rId4">
             <p14:nvContentPartPr>
               <p14:cNvPr id="40" name="Ink 39">
@@ -8326,7 +8326,7 @@
             </p14:xfrm>
           </p:contentPart>
         </mc:Choice>
-        <mc:Fallback>
+        <mc:Fallback xmlns="">
           <p:pic>
             <p:nvPicPr>
               <p:cNvPr id="40" name="Ink 39">
@@ -8429,8 +8429,8 @@
           </a:p>
         </p:txBody>
       </p:sp>
-      <mc:AlternateContent xmlns:mc="http://schemas.openxmlformats.org/markup-compatibility/2006">
-        <mc:Choice xmlns:p14="http://schemas.microsoft.com/office/powerpoint/2010/main" Requires="p14">
+      <mc:AlternateContent xmlns:mc="http://schemas.openxmlformats.org/markup-compatibility/2006" xmlns:p14="http://schemas.microsoft.com/office/powerpoint/2010/main">
+        <mc:Choice Requires="p14">
           <p:contentPart p14:bwMode="auto" r:id="rId5">
             <p14:nvContentPartPr>
               <p14:cNvPr id="43" name="Ink 42">
@@ -8449,7 +8449,7 @@
             </p14:xfrm>
           </p:contentPart>
         </mc:Choice>
-        <mc:Fallback>
+        <mc:Fallback xmlns="">
           <p:pic>
             <p:nvPicPr>
               <p:cNvPr id="43" name="Ink 42">
@@ -8832,8 +8832,8 @@
           </a:p>
         </p:txBody>
       </p:sp>
-      <mc:AlternateContent xmlns:mc="http://schemas.openxmlformats.org/markup-compatibility/2006">
-        <mc:Choice xmlns:p14="http://schemas.microsoft.com/office/powerpoint/2010/main" Requires="p14">
+      <mc:AlternateContent xmlns:mc="http://schemas.openxmlformats.org/markup-compatibility/2006" xmlns:p14="http://schemas.microsoft.com/office/powerpoint/2010/main">
+        <mc:Choice Requires="p14">
           <p:contentPart p14:bwMode="auto" r:id="rId14">
             <p14:nvContentPartPr>
               <p14:cNvPr id="2" name="Ink 1">
@@ -8852,7 +8852,7 @@
             </p14:xfrm>
           </p:contentPart>
         </mc:Choice>
-        <mc:Fallback>
+        <mc:Fallback xmlns="">
           <p:pic>
             <p:nvPicPr>
               <p:cNvPr id="2" name="Ink 1">
@@ -9180,8 +9180,8 @@
           </mc:Fallback>
         </mc:AlternateContent>
       </p:grpSp>
-      <mc:AlternateContent xmlns:mc="http://schemas.openxmlformats.org/markup-compatibility/2006">
-        <mc:Choice xmlns:p14="http://schemas.microsoft.com/office/powerpoint/2010/main" Requires="p14">
+      <mc:AlternateContent xmlns:mc="http://schemas.openxmlformats.org/markup-compatibility/2006" xmlns:p14="http://schemas.microsoft.com/office/powerpoint/2010/main">
+        <mc:Choice Requires="p14">
           <p:contentPart p14:bwMode="auto" r:id="rId25">
             <p14:nvContentPartPr>
               <p14:cNvPr id="60" name="Ink 59">
@@ -9200,7 +9200,7 @@
             </p14:xfrm>
           </p:contentPart>
         </mc:Choice>
-        <mc:Fallback>
+        <mc:Fallback xmlns="">
           <p:pic>
             <p:nvPicPr>
               <p:cNvPr id="60" name="Ink 59">
@@ -9474,18 +9474,15 @@
             <a:pPr algn="ctr"/>
             <a:r>
               <a:rPr lang="en-US" sz="2400" dirty="0">
-                <a:solidFill>
-                  <a:srgbClr val="FF0000"/>
-                </a:solidFill>
                 <a:latin typeface="Times" pitchFamily="2" charset="0"/>
               </a:rPr>
-              <a:t>Randomization cuts other causal connections </a:t>
+              <a:t>Randomization cuts causal connections </a:t>
             </a:r>
           </a:p>
         </p:txBody>
       </p:sp>
-      <mc:AlternateContent xmlns:mc="http://schemas.openxmlformats.org/markup-compatibility/2006">
-        <mc:Choice xmlns:p14="http://schemas.microsoft.com/office/powerpoint/2010/main" Requires="p14">
+      <mc:AlternateContent xmlns:mc="http://schemas.openxmlformats.org/markup-compatibility/2006" xmlns:p14="http://schemas.microsoft.com/office/powerpoint/2010/main">
+        <mc:Choice Requires="p14">
           <p:contentPart p14:bwMode="auto" r:id="rId33">
             <p14:nvContentPartPr>
               <p14:cNvPr id="31" name="Ink 30">
@@ -9504,7 +9501,7 @@
             </p14:xfrm>
           </p:contentPart>
         </mc:Choice>
-        <mc:Fallback>
+        <mc:Fallback xmlns="">
           <p:pic>
             <p:nvPicPr>
               <p:cNvPr id="31" name="Ink 30">
@@ -9535,8 +9532,8 @@
           </p:pic>
         </mc:Fallback>
       </mc:AlternateContent>
-      <mc:AlternateContent xmlns:mc="http://schemas.openxmlformats.org/markup-compatibility/2006">
-        <mc:Choice xmlns:p14="http://schemas.microsoft.com/office/powerpoint/2010/main" Requires="p14">
+      <mc:AlternateContent xmlns:mc="http://schemas.openxmlformats.org/markup-compatibility/2006" xmlns:p14="http://schemas.microsoft.com/office/powerpoint/2010/main">
+        <mc:Choice Requires="p14">
           <p:contentPart p14:bwMode="auto" r:id="rId35">
             <p14:nvContentPartPr>
               <p14:cNvPr id="32" name="Ink 31">
@@ -9555,7 +9552,7 @@
             </p14:xfrm>
           </p:contentPart>
         </mc:Choice>
-        <mc:Fallback>
+        <mc:Fallback xmlns="">
           <p:pic>
             <p:nvPicPr>
               <p:cNvPr id="32" name="Ink 31">
@@ -9586,8 +9583,8 @@
           </p:pic>
         </mc:Fallback>
       </mc:AlternateContent>
-      <mc:AlternateContent xmlns:mc="http://schemas.openxmlformats.org/markup-compatibility/2006">
-        <mc:Choice xmlns:p14="http://schemas.microsoft.com/office/powerpoint/2010/main" Requires="p14">
+      <mc:AlternateContent xmlns:mc="http://schemas.openxmlformats.org/markup-compatibility/2006" xmlns:p14="http://schemas.microsoft.com/office/powerpoint/2010/main">
+        <mc:Choice Requires="p14">
           <p:contentPart p14:bwMode="auto" r:id="rId36">
             <p14:nvContentPartPr>
               <p14:cNvPr id="33" name="Ink 32">
@@ -9606,7 +9603,7 @@
             </p14:xfrm>
           </p:contentPart>
         </mc:Choice>
-        <mc:Fallback>
+        <mc:Fallback xmlns="">
           <p:pic>
             <p:nvPicPr>
               <p:cNvPr id="33" name="Ink 32">
@@ -9709,8 +9706,8 @@
           </a:p>
         </p:txBody>
       </p:sp>
-      <mc:AlternateContent xmlns:mc="http://schemas.openxmlformats.org/markup-compatibility/2006">
-        <mc:Choice xmlns:p14="http://schemas.microsoft.com/office/powerpoint/2010/main" Requires="p14">
+      <mc:AlternateContent xmlns:mc="http://schemas.openxmlformats.org/markup-compatibility/2006" xmlns:p14="http://schemas.microsoft.com/office/powerpoint/2010/main">
+        <mc:Choice Requires="p14">
           <p:contentPart p14:bwMode="auto" r:id="rId37">
             <p14:nvContentPartPr>
               <p14:cNvPr id="36" name="Ink 35">
@@ -9729,7 +9726,7 @@
             </p14:xfrm>
           </p:contentPart>
         </mc:Choice>
-        <mc:Fallback>
+        <mc:Fallback xmlns="">
           <p:pic>
             <p:nvPicPr>
               <p:cNvPr id="36" name="Ink 35">
@@ -9760,8 +9757,8 @@
           </p:pic>
         </mc:Fallback>
       </mc:AlternateContent>
-      <mc:AlternateContent xmlns:mc="http://schemas.openxmlformats.org/markup-compatibility/2006">
-        <mc:Choice xmlns:p14="http://schemas.microsoft.com/office/powerpoint/2010/main" Requires="p14">
+      <mc:AlternateContent xmlns:mc="http://schemas.openxmlformats.org/markup-compatibility/2006" xmlns:p14="http://schemas.microsoft.com/office/powerpoint/2010/main">
+        <mc:Choice Requires="p14">
           <p:contentPart p14:bwMode="auto" r:id="rId39">
             <p14:nvContentPartPr>
               <p14:cNvPr id="38" name="Ink 37">
@@ -9780,7 +9777,7 @@
             </p14:xfrm>
           </p:contentPart>
         </mc:Choice>
-        <mc:Fallback>
+        <mc:Fallback xmlns="">
           <p:pic>
             <p:nvPicPr>
               <p:cNvPr id="38" name="Ink 37">
@@ -9970,8 +9967,8 @@
           </a:p>
         </p:txBody>
       </p:sp>
-      <mc:AlternateContent xmlns:mc="http://schemas.openxmlformats.org/markup-compatibility/2006">
-        <mc:Choice xmlns:p14="http://schemas.microsoft.com/office/powerpoint/2010/main" Requires="p14">
+      <mc:AlternateContent xmlns:mc="http://schemas.openxmlformats.org/markup-compatibility/2006" xmlns:p14="http://schemas.microsoft.com/office/powerpoint/2010/main">
+        <mc:Choice Requires="p14">
           <p:contentPart p14:bwMode="auto" r:id="rId45">
             <p14:nvContentPartPr>
               <p14:cNvPr id="54" name="Ink 53">
@@ -9990,7 +9987,7 @@
             </p14:xfrm>
           </p:contentPart>
         </mc:Choice>
-        <mc:Fallback>
+        <mc:Fallback xmlns="">
           <p:pic>
             <p:nvPicPr>
               <p:cNvPr id="54" name="Ink 53">
@@ -10195,8 +10192,8 @@
           </mc:Fallback>
         </mc:AlternateContent>
       </p:grpSp>
-      <mc:AlternateContent xmlns:mc="http://schemas.openxmlformats.org/markup-compatibility/2006">
-        <mc:Choice xmlns:p14="http://schemas.microsoft.com/office/powerpoint/2010/main" Requires="p14">
+      <mc:AlternateContent xmlns:mc="http://schemas.openxmlformats.org/markup-compatibility/2006" xmlns:p14="http://schemas.microsoft.com/office/powerpoint/2010/main">
+        <mc:Choice Requires="p14">
           <p:contentPart p14:bwMode="auto" r:id="rId49">
             <p14:nvContentPartPr>
               <p14:cNvPr id="65" name="Ink 64">
@@ -10215,7 +10212,7 @@
             </p14:xfrm>
           </p:contentPart>
         </mc:Choice>
-        <mc:Fallback>
+        <mc:Fallback xmlns="">
           <p:pic>
             <p:nvPicPr>
               <p:cNvPr id="65" name="Ink 64">
@@ -11758,7 +11755,19 @@
               <a:rPr lang="en-US" sz="2400" dirty="0">
                 <a:latin typeface="Times" pitchFamily="2" charset="0"/>
               </a:rPr>
-              <a:t>Randomization removes other unknown confounds</a:t>
+              <a:t>Randomization removes </a:t>
+            </a:r>
+            <a:r>
+              <a:rPr lang="en-US" sz="2400" b="1" dirty="0">
+                <a:latin typeface="Times" pitchFamily="2" charset="0"/>
+              </a:rPr>
+              <a:t>all </a:t>
+            </a:r>
+            <a:r>
+              <a:rPr lang="en-US" sz="2400" dirty="0">
+                <a:latin typeface="Times" pitchFamily="2" charset="0"/>
+              </a:rPr>
+              <a:t>unknown confounds</a:t>
             </a:r>
           </a:p>
         </p:txBody>
@@ -12396,8 +12405,8 @@
           <a:chExt cx="0" cy="0"/>
         </a:xfrm>
       </p:grpSpPr>
-      <mc:AlternateContent xmlns:mc="http://schemas.openxmlformats.org/markup-compatibility/2006">
-        <mc:Choice xmlns:p14="http://schemas.microsoft.com/office/powerpoint/2010/main" Requires="p14">
+      <mc:AlternateContent xmlns:mc="http://schemas.openxmlformats.org/markup-compatibility/2006" xmlns:p14="http://schemas.microsoft.com/office/powerpoint/2010/main">
+        <mc:Choice Requires="p14">
           <p:contentPart p14:bwMode="auto" r:id="rId2">
             <p14:nvContentPartPr>
               <p14:cNvPr id="37" name="Ink 36">
@@ -12416,7 +12425,7 @@
             </p14:xfrm>
           </p:contentPart>
         </mc:Choice>
-        <mc:Fallback>
+        <mc:Fallback xmlns="">
           <p:pic>
             <p:nvPicPr>
               <p:cNvPr id="37" name="Ink 36">
@@ -12447,8 +12456,8 @@
           </p:pic>
         </mc:Fallback>
       </mc:AlternateContent>
-      <mc:AlternateContent xmlns:mc="http://schemas.openxmlformats.org/markup-compatibility/2006">
-        <mc:Choice xmlns:p14="http://schemas.microsoft.com/office/powerpoint/2010/main" Requires="p14">
+      <mc:AlternateContent xmlns:mc="http://schemas.openxmlformats.org/markup-compatibility/2006" xmlns:p14="http://schemas.microsoft.com/office/powerpoint/2010/main">
+        <mc:Choice Requires="p14">
           <p:contentPart p14:bwMode="auto" r:id="rId4">
             <p14:nvContentPartPr>
               <p14:cNvPr id="40" name="Ink 39">
@@ -12467,7 +12476,7 @@
             </p14:xfrm>
           </p:contentPart>
         </mc:Choice>
-        <mc:Fallback>
+        <mc:Fallback xmlns="">
           <p:pic>
             <p:nvPicPr>
               <p:cNvPr id="40" name="Ink 39">
@@ -12570,8 +12579,8 @@
           </a:p>
         </p:txBody>
       </p:sp>
-      <mc:AlternateContent xmlns:mc="http://schemas.openxmlformats.org/markup-compatibility/2006">
-        <mc:Choice xmlns:p14="http://schemas.microsoft.com/office/powerpoint/2010/main" Requires="p14">
+      <mc:AlternateContent xmlns:mc="http://schemas.openxmlformats.org/markup-compatibility/2006" xmlns:p14="http://schemas.microsoft.com/office/powerpoint/2010/main">
+        <mc:Choice Requires="p14">
           <p:contentPart p14:bwMode="auto" r:id="rId5">
             <p14:nvContentPartPr>
               <p14:cNvPr id="43" name="Ink 42">
@@ -12590,7 +12599,7 @@
             </p14:xfrm>
           </p:contentPart>
         </mc:Choice>
-        <mc:Fallback>
+        <mc:Fallback xmlns="">
           <p:pic>
             <p:nvPicPr>
               <p:cNvPr id="43" name="Ink 42">
@@ -12973,8 +12982,8 @@
           </a:p>
         </p:txBody>
       </p:sp>
-      <mc:AlternateContent xmlns:mc="http://schemas.openxmlformats.org/markup-compatibility/2006">
-        <mc:Choice xmlns:p14="http://schemas.microsoft.com/office/powerpoint/2010/main" Requires="p14">
+      <mc:AlternateContent xmlns:mc="http://schemas.openxmlformats.org/markup-compatibility/2006" xmlns:p14="http://schemas.microsoft.com/office/powerpoint/2010/main">
+        <mc:Choice Requires="p14">
           <p:contentPart p14:bwMode="auto" r:id="rId14">
             <p14:nvContentPartPr>
               <p14:cNvPr id="2" name="Ink 1">
@@ -12993,7 +13002,7 @@
             </p14:xfrm>
           </p:contentPart>
         </mc:Choice>
-        <mc:Fallback>
+        <mc:Fallback xmlns="">
           <p:pic>
             <p:nvPicPr>
               <p:cNvPr id="2" name="Ink 1">
@@ -13321,8 +13330,8 @@
           </mc:Fallback>
         </mc:AlternateContent>
       </p:grpSp>
-      <mc:AlternateContent xmlns:mc="http://schemas.openxmlformats.org/markup-compatibility/2006">
-        <mc:Choice xmlns:p14="http://schemas.microsoft.com/office/powerpoint/2010/main" Requires="p14">
+      <mc:AlternateContent xmlns:mc="http://schemas.openxmlformats.org/markup-compatibility/2006" xmlns:p14="http://schemas.microsoft.com/office/powerpoint/2010/main">
+        <mc:Choice Requires="p14">
           <p:contentPart p14:bwMode="auto" r:id="rId25">
             <p14:nvContentPartPr>
               <p14:cNvPr id="60" name="Ink 59">
@@ -13341,7 +13350,7 @@
             </p14:xfrm>
           </p:contentPart>
         </mc:Choice>
-        <mc:Fallback>
+        <mc:Fallback xmlns="">
           <p:pic>
             <p:nvPicPr>
               <p:cNvPr id="60" name="Ink 59">
@@ -13625,8 +13634,8 @@
           </a:p>
         </p:txBody>
       </p:sp>
-      <mc:AlternateContent xmlns:mc="http://schemas.openxmlformats.org/markup-compatibility/2006">
-        <mc:Choice xmlns:p14="http://schemas.microsoft.com/office/powerpoint/2010/main" Requires="p14">
+      <mc:AlternateContent xmlns:mc="http://schemas.openxmlformats.org/markup-compatibility/2006" xmlns:p14="http://schemas.microsoft.com/office/powerpoint/2010/main">
+        <mc:Choice Requires="p14">
           <p:contentPart p14:bwMode="auto" r:id="rId33">
             <p14:nvContentPartPr>
               <p14:cNvPr id="31" name="Ink 30">
@@ -13645,7 +13654,7 @@
             </p14:xfrm>
           </p:contentPart>
         </mc:Choice>
-        <mc:Fallback>
+        <mc:Fallback xmlns="">
           <p:pic>
             <p:nvPicPr>
               <p:cNvPr id="31" name="Ink 30">
@@ -13676,8 +13685,8 @@
           </p:pic>
         </mc:Fallback>
       </mc:AlternateContent>
-      <mc:AlternateContent xmlns:mc="http://schemas.openxmlformats.org/markup-compatibility/2006">
-        <mc:Choice xmlns:p14="http://schemas.microsoft.com/office/powerpoint/2010/main" Requires="p14">
+      <mc:AlternateContent xmlns:mc="http://schemas.openxmlformats.org/markup-compatibility/2006" xmlns:p14="http://schemas.microsoft.com/office/powerpoint/2010/main">
+        <mc:Choice Requires="p14">
           <p:contentPart p14:bwMode="auto" r:id="rId35">
             <p14:nvContentPartPr>
               <p14:cNvPr id="32" name="Ink 31">
@@ -13696,7 +13705,7 @@
             </p14:xfrm>
           </p:contentPart>
         </mc:Choice>
-        <mc:Fallback>
+        <mc:Fallback xmlns="">
           <p:pic>
             <p:nvPicPr>
               <p:cNvPr id="32" name="Ink 31">
@@ -13727,8 +13736,8 @@
           </p:pic>
         </mc:Fallback>
       </mc:AlternateContent>
-      <mc:AlternateContent xmlns:mc="http://schemas.openxmlformats.org/markup-compatibility/2006">
-        <mc:Choice xmlns:p14="http://schemas.microsoft.com/office/powerpoint/2010/main" Requires="p14">
+      <mc:AlternateContent xmlns:mc="http://schemas.openxmlformats.org/markup-compatibility/2006" xmlns:p14="http://schemas.microsoft.com/office/powerpoint/2010/main">
+        <mc:Choice Requires="p14">
           <p:contentPart p14:bwMode="auto" r:id="rId36">
             <p14:nvContentPartPr>
               <p14:cNvPr id="33" name="Ink 32">
@@ -13747,7 +13756,7 @@
             </p14:xfrm>
           </p:contentPart>
         </mc:Choice>
-        <mc:Fallback>
+        <mc:Fallback xmlns="">
           <p:pic>
             <p:nvPicPr>
               <p:cNvPr id="33" name="Ink 32">
@@ -14009,8 +14018,8 @@
           </a:p>
         </p:txBody>
       </p:sp>
-      <mc:AlternateContent xmlns:mc="http://schemas.openxmlformats.org/markup-compatibility/2006">
-        <mc:Choice xmlns:p14="http://schemas.microsoft.com/office/powerpoint/2010/main" Requires="p14">
+      <mc:AlternateContent xmlns:mc="http://schemas.openxmlformats.org/markup-compatibility/2006" xmlns:p14="http://schemas.microsoft.com/office/powerpoint/2010/main">
+        <mc:Choice Requires="p14">
           <p:contentPart p14:bwMode="auto" r:id="rId43">
             <p14:nvContentPartPr>
               <p14:cNvPr id="54" name="Ink 53">
@@ -14029,7 +14038,7 @@
             </p14:xfrm>
           </p:contentPart>
         </mc:Choice>
-        <mc:Fallback>
+        <mc:Fallback xmlns="">
           <p:pic>
             <p:nvPicPr>
               <p:cNvPr id="54" name="Ink 53">

</xml_diff>